<commit_message>
commit pour ma tour
</commit_message>
<xml_diff>
--- a/Documents/Oiseau qui fait brrrr.pptx
+++ b/Documents/Oiseau qui fait brrrr.pptx
@@ -14,6 +14,7 @@
     <p:sldId id="263" r:id="rId8"/>
     <p:sldId id="260" r:id="rId9"/>
     <p:sldId id="259" r:id="rId10"/>
+    <p:sldId id="265" r:id="rId11"/>
   </p:sldIdLst>
   <p:sldSz cx="12192000" cy="6858000"/>
   <p:notesSz cx="6858000" cy="9144000"/>
@@ -267,7 +268,7 @@
           <a:p>
             <a:fld id="{FE0551F4-6C62-42E5-A562-C69B050529F5}" type="datetimeFigureOut">
               <a:rPr lang="fr-FR" smtClean="0"/>
-              <a:t>20/02/2022</a:t>
+              <a:t>21/02/2022</a:t>
             </a:fld>
             <a:endParaRPr lang="fr-FR"/>
           </a:p>
@@ -465,7 +466,7 @@
           <a:p>
             <a:fld id="{FE0551F4-6C62-42E5-A562-C69B050529F5}" type="datetimeFigureOut">
               <a:rPr lang="fr-FR" smtClean="0"/>
-              <a:t>20/02/2022</a:t>
+              <a:t>21/02/2022</a:t>
             </a:fld>
             <a:endParaRPr lang="fr-FR"/>
           </a:p>
@@ -673,7 +674,7 @@
           <a:p>
             <a:fld id="{FE0551F4-6C62-42E5-A562-C69B050529F5}" type="datetimeFigureOut">
               <a:rPr lang="fr-FR" smtClean="0"/>
-              <a:t>20/02/2022</a:t>
+              <a:t>21/02/2022</a:t>
             </a:fld>
             <a:endParaRPr lang="fr-FR"/>
           </a:p>
@@ -871,7 +872,7 @@
           <a:p>
             <a:fld id="{FE0551F4-6C62-42E5-A562-C69B050529F5}" type="datetimeFigureOut">
               <a:rPr lang="fr-FR" smtClean="0"/>
-              <a:t>20/02/2022</a:t>
+              <a:t>21/02/2022</a:t>
             </a:fld>
             <a:endParaRPr lang="fr-FR"/>
           </a:p>
@@ -1146,7 +1147,7 @@
           <a:p>
             <a:fld id="{FE0551F4-6C62-42E5-A562-C69B050529F5}" type="datetimeFigureOut">
               <a:rPr lang="fr-FR" smtClean="0"/>
-              <a:t>20/02/2022</a:t>
+              <a:t>21/02/2022</a:t>
             </a:fld>
             <a:endParaRPr lang="fr-FR"/>
           </a:p>
@@ -1411,7 +1412,7 @@
           <a:p>
             <a:fld id="{FE0551F4-6C62-42E5-A562-C69B050529F5}" type="datetimeFigureOut">
               <a:rPr lang="fr-FR" smtClean="0"/>
-              <a:t>20/02/2022</a:t>
+              <a:t>21/02/2022</a:t>
             </a:fld>
             <a:endParaRPr lang="fr-FR"/>
           </a:p>
@@ -1823,7 +1824,7 @@
           <a:p>
             <a:fld id="{FE0551F4-6C62-42E5-A562-C69B050529F5}" type="datetimeFigureOut">
               <a:rPr lang="fr-FR" smtClean="0"/>
-              <a:t>20/02/2022</a:t>
+              <a:t>21/02/2022</a:t>
             </a:fld>
             <a:endParaRPr lang="fr-FR"/>
           </a:p>
@@ -1964,7 +1965,7 @@
           <a:p>
             <a:fld id="{FE0551F4-6C62-42E5-A562-C69B050529F5}" type="datetimeFigureOut">
               <a:rPr lang="fr-FR" smtClean="0"/>
-              <a:t>20/02/2022</a:t>
+              <a:t>21/02/2022</a:t>
             </a:fld>
             <a:endParaRPr lang="fr-FR"/>
           </a:p>
@@ -2077,7 +2078,7 @@
           <a:p>
             <a:fld id="{FE0551F4-6C62-42E5-A562-C69B050529F5}" type="datetimeFigureOut">
               <a:rPr lang="fr-FR" smtClean="0"/>
-              <a:t>20/02/2022</a:t>
+              <a:t>21/02/2022</a:t>
             </a:fld>
             <a:endParaRPr lang="fr-FR"/>
           </a:p>
@@ -2388,7 +2389,7 @@
           <a:p>
             <a:fld id="{FE0551F4-6C62-42E5-A562-C69B050529F5}" type="datetimeFigureOut">
               <a:rPr lang="fr-FR" smtClean="0"/>
-              <a:t>20/02/2022</a:t>
+              <a:t>21/02/2022</a:t>
             </a:fld>
             <a:endParaRPr lang="fr-FR"/>
           </a:p>
@@ -2676,7 +2677,7 @@
           <a:p>
             <a:fld id="{FE0551F4-6C62-42E5-A562-C69B050529F5}" type="datetimeFigureOut">
               <a:rPr lang="fr-FR" smtClean="0"/>
-              <a:t>20/02/2022</a:t>
+              <a:t>21/02/2022</a:t>
             </a:fld>
             <a:endParaRPr lang="fr-FR"/>
           </a:p>
@@ -2917,7 +2918,7 @@
           <a:p>
             <a:fld id="{FE0551F4-6C62-42E5-A562-C69B050529F5}" type="datetimeFigureOut">
               <a:rPr lang="fr-FR" smtClean="0"/>
-              <a:t>20/02/2022</a:t>
+              <a:t>21/02/2022</a:t>
             </a:fld>
             <a:endParaRPr lang="fr-FR"/>
           </a:p>
@@ -3408,6 +3409,111 @@
 </p:sld>
 </file>
 
+<file path=ppt/slides/slide10.xml><?xml version="1.0" encoding="utf-8"?>
+<p:sld xmlns:a="http://schemas.openxmlformats.org/drawingml/2006/main" xmlns:r="http://schemas.openxmlformats.org/officeDocument/2006/relationships" xmlns:p="http://schemas.openxmlformats.org/presentationml/2006/main">
+  <p:cSld>
+    <p:spTree>
+      <p:nvGrpSpPr>
+        <p:cNvPr id="1" name=""/>
+        <p:cNvGrpSpPr/>
+        <p:nvPr/>
+      </p:nvGrpSpPr>
+      <p:grpSpPr>
+        <a:xfrm>
+          <a:off x="0" y="0"/>
+          <a:ext cx="0" cy="0"/>
+          <a:chOff x="0" y="0"/>
+          <a:chExt cx="0" cy="0"/>
+        </a:xfrm>
+      </p:grpSpPr>
+      <p:sp>
+        <p:nvSpPr>
+          <p:cNvPr id="2" name="Titre 1">
+            <a:extLst>
+              <a:ext uri="{FF2B5EF4-FFF2-40B4-BE49-F238E27FC236}">
+                <a16:creationId xmlns:a16="http://schemas.microsoft.com/office/drawing/2014/main" id="{84241AA3-265C-49A6-995B-7060E3AE5B5A}"/>
+              </a:ext>
+            </a:extLst>
+          </p:cNvPr>
+          <p:cNvSpPr>
+            <a:spLocks noGrp="1"/>
+          </p:cNvSpPr>
+          <p:nvPr>
+            <p:ph type="title"/>
+          </p:nvPr>
+        </p:nvSpPr>
+        <p:spPr/>
+        <p:txBody>
+          <a:bodyPr/>
+          <a:lstStyle/>
+          <a:p>
+            <a:r>
+              <a:rPr lang="fr-FR" dirty="0"/>
+              <a:t>Perspective d’avenir/avancement </a:t>
+            </a:r>
+            <a:r>
+              <a:rPr lang="fr-FR" dirty="0" err="1"/>
+              <a:t>proojet</a:t>
+            </a:r>
+            <a:endParaRPr lang="fr-FR" dirty="0"/>
+          </a:p>
+        </p:txBody>
+      </p:sp>
+      <p:sp>
+        <p:nvSpPr>
+          <p:cNvPr id="3" name="Espace réservé du contenu 2">
+            <a:extLst>
+              <a:ext uri="{FF2B5EF4-FFF2-40B4-BE49-F238E27FC236}">
+                <a16:creationId xmlns:a16="http://schemas.microsoft.com/office/drawing/2014/main" id="{D7C8A4AA-F3A5-4C52-B220-969A86683A5B}"/>
+              </a:ext>
+            </a:extLst>
+          </p:cNvPr>
+          <p:cNvSpPr>
+            <a:spLocks noGrp="1"/>
+          </p:cNvSpPr>
+          <p:nvPr>
+            <p:ph idx="1"/>
+          </p:nvPr>
+        </p:nvSpPr>
+        <p:spPr/>
+        <p:txBody>
+          <a:bodyPr/>
+          <a:lstStyle/>
+          <a:p>
+            <a:endParaRPr lang="fr-FR" dirty="0"/>
+          </a:p>
+          <a:p>
+            <a:endParaRPr lang="fr-FR" dirty="0"/>
+          </a:p>
+          <a:p>
+            <a:r>
+              <a:rPr lang="fr-FR" dirty="0"/>
+              <a:t>Un puzzle </a:t>
+            </a:r>
+            <a:r>
+              <a:rPr lang="fr-FR" dirty="0" err="1"/>
+              <a:t>game</a:t>
+            </a:r>
+            <a:r>
+              <a:rPr lang="fr-FR" dirty="0"/>
+              <a:t> en 3D dans lequel le joueur contrôle un avatar et parcourt des tableaux quadrillés. la topologie des tableaux évolue en fonction des mouvements du joueurs, ceux-ci étant décomptés. Lorsque le joueur consomme tous ses déplacements, les éléments du monde et son avatar sont renvoyé à leur position d'origine. le joueur doit explorer l'environnement et comprendre son rythme afin de résoudre le puzzle de chaque tableau. </a:t>
+            </a:r>
+          </a:p>
+        </p:txBody>
+      </p:sp>
+    </p:spTree>
+    <p:extLst>
+      <p:ext uri="{BB962C8B-B14F-4D97-AF65-F5344CB8AC3E}">
+        <p14:creationId xmlns:p14="http://schemas.microsoft.com/office/powerpoint/2010/main" val="768694219"/>
+      </p:ext>
+    </p:extLst>
+  </p:cSld>
+  <p:clrMapOvr>
+    <a:masterClrMapping/>
+  </p:clrMapOvr>
+</p:sld>
+</file>
+
 <file path=ppt/slides/slide2.xml><?xml version="1.0" encoding="utf-8"?>
 <p:sld xmlns:a="http://schemas.openxmlformats.org/drawingml/2006/main" xmlns:r="http://schemas.openxmlformats.org/officeDocument/2006/relationships" xmlns:p="http://schemas.openxmlformats.org/presentationml/2006/main">
   <p:cSld>
@@ -3628,26 +3734,99 @@
       </p:sp>
       <p:sp>
         <p:nvSpPr>
-          <p:cNvPr id="3" name="Espace réservé du contenu 2">
-            <a:extLst>
-              <a:ext uri="{FF2B5EF4-FFF2-40B4-BE49-F238E27FC236}">
-                <a16:creationId xmlns:a16="http://schemas.microsoft.com/office/drawing/2014/main" id="{2F472399-789B-4429-983B-25A477EC5895}"/>
-              </a:ext>
-            </a:extLst>
-          </p:cNvPr>
-          <p:cNvSpPr>
-            <a:spLocks noGrp="1"/>
-          </p:cNvSpPr>
-          <p:nvPr>
-            <p:ph idx="1"/>
-          </p:nvPr>
-        </p:nvSpPr>
-        <p:spPr/>
-        <p:txBody>
-          <a:bodyPr/>
-          <a:lstStyle/>
-          <a:p>
-            <a:endParaRPr lang="fr-FR"/>
+          <p:cNvPr id="4" name="Espace réservé du contenu 3">
+            <a:extLst>
+              <a:ext uri="{FF2B5EF4-FFF2-40B4-BE49-F238E27FC236}">
+                <a16:creationId xmlns:a16="http://schemas.microsoft.com/office/drawing/2014/main" id="{914AF26B-611D-4D27-864F-75280AAD0DA5}"/>
+              </a:ext>
+            </a:extLst>
+          </p:cNvPr>
+          <p:cNvSpPr>
+            <a:spLocks noGrp="1"/>
+          </p:cNvSpPr>
+          <p:nvPr>
+            <p:ph sz="half" idx="1"/>
+          </p:nvPr>
+        </p:nvSpPr>
+        <p:spPr/>
+        <p:txBody>
+          <a:bodyPr/>
+          <a:lstStyle/>
+          <a:p>
+            <a:endParaRPr lang="fr-FR" dirty="0"/>
+          </a:p>
+          <a:p>
+            <a:r>
+              <a:rPr lang="fr-FR" dirty="0"/>
+              <a:t>Répétition </a:t>
+            </a:r>
+          </a:p>
+          <a:p>
+            <a:endParaRPr lang="fr-FR" dirty="0"/>
+          </a:p>
+          <a:p>
+            <a:r>
+              <a:rPr lang="fr-FR" dirty="0"/>
+              <a:t>Variation</a:t>
+            </a:r>
+          </a:p>
+          <a:p>
+            <a:endParaRPr lang="fr-FR" dirty="0"/>
+          </a:p>
+          <a:p>
+            <a:r>
+              <a:rPr lang="fr-FR" dirty="0"/>
+              <a:t>Evolution</a:t>
+            </a:r>
+          </a:p>
+        </p:txBody>
+      </p:sp>
+      <p:sp>
+        <p:nvSpPr>
+          <p:cNvPr id="5" name="Espace réservé du contenu 4">
+            <a:extLst>
+              <a:ext uri="{FF2B5EF4-FFF2-40B4-BE49-F238E27FC236}">
+                <a16:creationId xmlns:a16="http://schemas.microsoft.com/office/drawing/2014/main" id="{4341EAE7-FA46-4FD3-B4E7-D7D4E6598075}"/>
+              </a:ext>
+            </a:extLst>
+          </p:cNvPr>
+          <p:cNvSpPr>
+            <a:spLocks noGrp="1"/>
+          </p:cNvSpPr>
+          <p:nvPr>
+            <p:ph sz="half" idx="2"/>
+          </p:nvPr>
+        </p:nvSpPr>
+        <p:spPr/>
+        <p:txBody>
+          <a:bodyPr/>
+          <a:lstStyle/>
+          <a:p>
+            <a:endParaRPr lang="fr-FR" dirty="0"/>
+          </a:p>
+          <a:p>
+            <a:r>
+              <a:rPr lang="fr-FR" dirty="0"/>
+              <a:t>Mémoriser</a:t>
+            </a:r>
+          </a:p>
+          <a:p>
+            <a:endParaRPr lang="fr-FR" dirty="0"/>
+          </a:p>
+          <a:p>
+            <a:r>
+              <a:rPr lang="fr-FR" dirty="0"/>
+              <a:t>Apprendre</a:t>
+            </a:r>
+          </a:p>
+          <a:p>
+            <a:endParaRPr lang="fr-FR" dirty="0"/>
+          </a:p>
+          <a:p>
+            <a:r>
+              <a:rPr lang="fr-FR" dirty="0"/>
+              <a:t>S’adapter</a:t>
+            </a:r>
           </a:p>
         </p:txBody>
       </p:sp>
@@ -4694,7 +4873,34 @@
           <a:bodyPr/>
           <a:lstStyle/>
           <a:p>
+            <a:r>
+              <a:rPr lang="fr-FR" dirty="0"/>
+              <a:t>Le joueur contrôle un avatar et parcourt un world quadrillé, il se déplace case par case et à une limite de case qu’il peut parcourir.</a:t>
+            </a:r>
+          </a:p>
+          <a:p>
+            <a:pPr marL="0" indent="0">
+              <a:buNone/>
+            </a:pPr>
+            <a:r>
+              <a:rPr lang="fr-FR" dirty="0"/>
+              <a:t> </a:t>
+            </a:r>
+          </a:p>
+          <a:p>
+            <a:r>
+              <a:rPr lang="fr-FR" dirty="0"/>
+              <a:t>La topologie du world évolue en fonction des mouvements du joueurs</a:t>
+            </a:r>
+          </a:p>
+          <a:p>
             <a:endParaRPr lang="fr-FR" dirty="0"/>
+          </a:p>
+          <a:p>
+            <a:r>
+              <a:rPr lang="fr-FR" dirty="0"/>
+              <a:t>Lorsque le joueur consomme tous ses déplacements, les éléments du monde et son avatar sont renvoyé à leur position d'origine. </a:t>
+            </a:r>
           </a:p>
         </p:txBody>
       </p:sp>

</xml_diff>